<commit_message>
MeetUp presentation - wip
</commit_message>
<xml_diff>
--- a/notes/meetUp_case_textPrediction.pptx
+++ b/notes/meetUp_case_textPrediction.pptx
@@ -5773,7 +5773,7 @@
           <a:p>
             <a:fld id="{01F17A57-A10D-4D0B-B521-43FD44F4BF34}" type="datetimeFigureOut">
               <a:rPr lang="en-US" smtClean="0"/>
-              <a:t>8/30/2016</a:t>
+              <a:t>8/31/2016</a:t>
             </a:fld>
             <a:endParaRPr lang="en-US"/>
           </a:p>
@@ -8413,7 +8413,7 @@
           <a:p>
             <a:fld id="{77742CB5-BF55-4D26-A769-AD7DC0521FF6}" type="datetimeFigureOut">
               <a:rPr lang="en-US" smtClean="0"/>
-              <a:t>8/30/2016</a:t>
+              <a:t>8/31/2016</a:t>
             </a:fld>
             <a:endParaRPr lang="en-US"/>
           </a:p>
@@ -8680,7 +8680,7 @@
           <a:p>
             <a:fld id="{77742CB5-BF55-4D26-A769-AD7DC0521FF6}" type="datetimeFigureOut">
               <a:rPr lang="en-US" smtClean="0"/>
-              <a:t>8/30/2016</a:t>
+              <a:t>8/31/2016</a:t>
             </a:fld>
             <a:endParaRPr lang="en-US"/>
           </a:p>
@@ -8911,7 +8911,7 @@
           <a:p>
             <a:fld id="{77742CB5-BF55-4D26-A769-AD7DC0521FF6}" type="datetimeFigureOut">
               <a:rPr lang="en-US" smtClean="0"/>
-              <a:t>8/30/2016</a:t>
+              <a:t>8/31/2016</a:t>
             </a:fld>
             <a:endParaRPr lang="en-US"/>
           </a:p>
@@ -9221,7 +9221,7 @@
           <a:p>
             <a:fld id="{77742CB5-BF55-4D26-A769-AD7DC0521FF6}" type="datetimeFigureOut">
               <a:rPr lang="en-US" smtClean="0"/>
-              <a:t>8/30/2016</a:t>
+              <a:t>8/31/2016</a:t>
             </a:fld>
             <a:endParaRPr lang="en-US"/>
           </a:p>
@@ -9694,7 +9694,7 @@
           <a:p>
             <a:fld id="{77742CB5-BF55-4D26-A769-AD7DC0521FF6}" type="datetimeFigureOut">
               <a:rPr lang="en-US" smtClean="0"/>
-              <a:t>8/30/2016</a:t>
+              <a:t>8/31/2016</a:t>
             </a:fld>
             <a:endParaRPr lang="en-US"/>
           </a:p>
@@ -10241,7 +10241,7 @@
           <a:p>
             <a:fld id="{77742CB5-BF55-4D26-A769-AD7DC0521FF6}" type="datetimeFigureOut">
               <a:rPr lang="en-US" smtClean="0"/>
-              <a:t>8/30/2016</a:t>
+              <a:t>8/31/2016</a:t>
             </a:fld>
             <a:endParaRPr lang="en-US"/>
           </a:p>
@@ -11015,7 +11015,7 @@
           <a:p>
             <a:fld id="{77742CB5-BF55-4D26-A769-AD7DC0521FF6}" type="datetimeFigureOut">
               <a:rPr lang="en-US" smtClean="0"/>
-              <a:t>8/30/2016</a:t>
+              <a:t>8/31/2016</a:t>
             </a:fld>
             <a:endParaRPr lang="en-US"/>
           </a:p>
@@ -11190,7 +11190,7 @@
           <a:p>
             <a:fld id="{77742CB5-BF55-4D26-A769-AD7DC0521FF6}" type="datetimeFigureOut">
               <a:rPr lang="en-US" smtClean="0"/>
-              <a:t>8/30/2016</a:t>
+              <a:t>8/31/2016</a:t>
             </a:fld>
             <a:endParaRPr lang="en-US"/>
           </a:p>
@@ -11413,7 +11413,7 @@
           <a:p>
             <a:fld id="{77742CB5-BF55-4D26-A769-AD7DC0521FF6}" type="datetimeFigureOut">
               <a:rPr lang="en-US" smtClean="0"/>
-              <a:t>8/30/2016</a:t>
+              <a:t>8/31/2016</a:t>
             </a:fld>
             <a:endParaRPr lang="en-US"/>
           </a:p>
@@ -11593,7 +11593,7 @@
           <a:p>
             <a:fld id="{77742CB5-BF55-4D26-A769-AD7DC0521FF6}" type="datetimeFigureOut">
               <a:rPr lang="en-US" smtClean="0"/>
-              <a:t>8/30/2016</a:t>
+              <a:t>8/31/2016</a:t>
             </a:fld>
             <a:endParaRPr lang="en-US"/>
           </a:p>
@@ -11882,7 +11882,7 @@
           <a:p>
             <a:fld id="{77742CB5-BF55-4D26-A769-AD7DC0521FF6}" type="datetimeFigureOut">
               <a:rPr lang="en-US" smtClean="0"/>
-              <a:t>8/30/2016</a:t>
+              <a:t>8/31/2016</a:t>
             </a:fld>
             <a:endParaRPr lang="en-US"/>
           </a:p>
@@ -12124,7 +12124,7 @@
           <a:p>
             <a:fld id="{77742CB5-BF55-4D26-A769-AD7DC0521FF6}" type="datetimeFigureOut">
               <a:rPr lang="en-US" smtClean="0"/>
-              <a:t>8/30/2016</a:t>
+              <a:t>8/31/2016</a:t>
             </a:fld>
             <a:endParaRPr lang="en-US"/>
           </a:p>
@@ -12503,7 +12503,7 @@
           <a:p>
             <a:fld id="{77742CB5-BF55-4D26-A769-AD7DC0521FF6}" type="datetimeFigureOut">
               <a:rPr lang="en-US" smtClean="0"/>
-              <a:t>8/30/2016</a:t>
+              <a:t>8/31/2016</a:t>
             </a:fld>
             <a:endParaRPr lang="en-US"/>
           </a:p>
@@ -12621,7 +12621,7 @@
           <a:p>
             <a:fld id="{77742CB5-BF55-4D26-A769-AD7DC0521FF6}" type="datetimeFigureOut">
               <a:rPr lang="en-US" smtClean="0"/>
-              <a:t>8/30/2016</a:t>
+              <a:t>8/31/2016</a:t>
             </a:fld>
             <a:endParaRPr lang="en-US"/>
           </a:p>
@@ -12716,7 +12716,7 @@
           <a:p>
             <a:fld id="{77742CB5-BF55-4D26-A769-AD7DC0521FF6}" type="datetimeFigureOut">
               <a:rPr lang="en-US" smtClean="0"/>
-              <a:t>8/30/2016</a:t>
+              <a:t>8/31/2016</a:t>
             </a:fld>
             <a:endParaRPr lang="en-US"/>
           </a:p>
@@ -12965,7 +12965,7 @@
           <a:p>
             <a:fld id="{77742CB5-BF55-4D26-A769-AD7DC0521FF6}" type="datetimeFigureOut">
               <a:rPr lang="en-US" smtClean="0"/>
-              <a:t>8/30/2016</a:t>
+              <a:t>8/31/2016</a:t>
             </a:fld>
             <a:endParaRPr lang="en-US"/>
           </a:p>
@@ -13222,7 +13222,7 @@
           <a:p>
             <a:fld id="{77742CB5-BF55-4D26-A769-AD7DC0521FF6}" type="datetimeFigureOut">
               <a:rPr lang="en-US" smtClean="0"/>
-              <a:t>8/30/2016</a:t>
+              <a:t>8/31/2016</a:t>
             </a:fld>
             <a:endParaRPr lang="en-US"/>
           </a:p>
@@ -13465,7 +13465,7 @@
           <a:p>
             <a:fld id="{77742CB5-BF55-4D26-A769-AD7DC0521FF6}" type="datetimeFigureOut">
               <a:rPr lang="en-US" smtClean="0"/>
-              <a:t>8/30/2016</a:t>
+              <a:t>8/31/2016</a:t>
             </a:fld>
             <a:endParaRPr lang="en-US"/>
           </a:p>
@@ -13886,14 +13886,59 @@
             <p:ph type="ctrTitle"/>
           </p:nvPr>
         </p:nvSpPr>
-        <p:spPr/>
+        <p:spPr>
+          <a:xfrm>
+            <a:off x="1605516" y="1765005"/>
+            <a:ext cx="9448800" cy="2384491"/>
+          </a:xfrm>
+        </p:spPr>
         <p:txBody>
-          <a:bodyPr/>
+          <a:bodyPr>
+            <a:normAutofit fontScale="90000"/>
+          </a:bodyPr>
           <a:lstStyle/>
           <a:p>
             <a:r>
               <a:rPr lang="en-US" sz="5400" dirty="0"/>
-              <a:t>Language Models</a:t>
+              <a:t>Developing</a:t>
+            </a:r>
+            <a:r>
+              <a:rPr lang="nb-NO" sz="5400" dirty="0"/>
+              <a:t> a </a:t>
+            </a:r>
+            <a:br>
+              <a:rPr lang="nb-NO" sz="5400" dirty="0"/>
+            </a:br>
+            <a:r>
+              <a:rPr lang="en-US" b="1" dirty="0"/>
+              <a:t>predictive</a:t>
+            </a:r>
+            <a:r>
+              <a:rPr lang="nb-NO" b="1" dirty="0"/>
+              <a:t> </a:t>
+            </a:r>
+            <a:r>
+              <a:rPr lang="en-US" b="1" dirty="0"/>
+              <a:t>model</a:t>
+            </a:r>
+            <a:r>
+              <a:rPr lang="nb-NO" sz="5400" dirty="0"/>
+              <a:t> </a:t>
+            </a:r>
+            <a:br>
+              <a:rPr lang="nb-NO" sz="5400" dirty="0"/>
+            </a:br>
+            <a:r>
+              <a:rPr lang="en-US" sz="5400" dirty="0"/>
+              <a:t>for</a:t>
+            </a:r>
+            <a:r>
+              <a:rPr lang="nb-NO" sz="5400" dirty="0"/>
+              <a:t> </a:t>
+            </a:r>
+            <a:r>
+              <a:rPr lang="en-GB" sz="5400" dirty="0"/>
+              <a:t>text prediction</a:t>
             </a:r>
           </a:p>
         </p:txBody>
@@ -13908,7 +13953,12 @@
             <p:ph type="subTitle" idx="1"/>
           </p:nvPr>
         </p:nvSpPr>
-        <p:spPr/>
+        <p:spPr>
+          <a:xfrm>
+            <a:off x="1839433" y="4333950"/>
+            <a:ext cx="5199321" cy="685800"/>
+          </a:xfrm>
+        </p:spPr>
         <p:txBody>
           <a:bodyPr>
             <a:normAutofit/>
@@ -13916,48 +13966,8 @@
           <a:lstStyle/>
           <a:p>
             <a:r>
-              <a:rPr lang="en-US" dirty="0"/>
-              <a:t>Developing</a:t>
-            </a:r>
-            <a:r>
               <a:rPr lang="nb-NO" dirty="0"/>
-              <a:t> a </a:t>
-            </a:r>
-            <a:r>
-              <a:rPr lang="en-US" sz="2400" b="1" dirty="0"/>
-              <a:t>predictive</a:t>
-            </a:r>
-            <a:r>
-              <a:rPr lang="nb-NO" sz="2400" b="1" dirty="0"/>
-              <a:t> </a:t>
-            </a:r>
-            <a:r>
-              <a:rPr lang="en-US" sz="2400" b="1" dirty="0"/>
-              <a:t>model</a:t>
-            </a:r>
-            <a:r>
-              <a:rPr lang="nb-NO" dirty="0"/>
-              <a:t> </a:t>
-            </a:r>
-            <a:r>
-              <a:rPr lang="en-US" dirty="0"/>
-              <a:t>for</a:t>
-            </a:r>
-            <a:r>
-              <a:rPr lang="nb-NO" dirty="0"/>
-              <a:t> </a:t>
-            </a:r>
-            <a:r>
-              <a:rPr lang="nb-NO" dirty="0" err="1"/>
-              <a:t>text</a:t>
-            </a:r>
-            <a:r>
-              <a:rPr lang="nb-NO" dirty="0"/>
-              <a:t> </a:t>
-            </a:r>
-            <a:r>
-              <a:rPr lang="nb-NO" dirty="0" err="1"/>
-              <a:t>prediction</a:t>
+              <a:t>Paracchini Pier Lorenzo</a:t>
             </a:r>
             <a:endParaRPr lang="en-US" dirty="0"/>
           </a:p>
@@ -14032,8 +14042,8 @@
         </p:nvSpPr>
         <p:spPr>
           <a:xfrm>
-            <a:off x="75624" y="1243052"/>
-            <a:ext cx="4996881" cy="1138773"/>
+            <a:off x="329315" y="1243052"/>
+            <a:ext cx="4489499" cy="1015663"/>
           </a:xfrm>
           <a:prstGeom prst="rect">
             <a:avLst/>
@@ -14048,7 +14058,7 @@
           <a:p>
             <a:pPr algn="ctr"/>
             <a:r>
-              <a:rPr lang="en-US" sz="3600" b="1" cap="none" spc="0" dirty="0">
+              <a:rPr lang="en-US" sz="2800" b="1" cap="none" spc="0" dirty="0">
                 <a:ln w="9525">
                   <a:solidFill>
                     <a:schemeClr val="bg1"/>
@@ -14138,7 +14148,7 @@
         <p:spPr>
           <a:xfrm>
             <a:off x="162925" y="3054625"/>
-            <a:ext cx="8534709" cy="1138773"/>
+            <a:ext cx="6886461" cy="1015663"/>
           </a:xfrm>
           <a:prstGeom prst="rect">
             <a:avLst/>
@@ -14146,14 +14156,14 @@
           <a:noFill/>
         </p:spPr>
         <p:txBody>
-          <a:bodyPr wrap="none" lIns="91440" tIns="45720" rIns="91440" bIns="45720">
+          <a:bodyPr wrap="square" lIns="91440" tIns="45720" rIns="91440" bIns="45720">
             <a:spAutoFit/>
           </a:bodyPr>
           <a:lstStyle/>
           <a:p>
             <a:pPr algn="ctr"/>
             <a:r>
-              <a:rPr lang="en-US" sz="3600" b="1" dirty="0">
+              <a:rPr lang="en-US" sz="2800" b="1" dirty="0">
                 <a:ln w="9525">
                   <a:solidFill>
                     <a:schemeClr val="bg1"/>
@@ -14171,7 +14181,7 @@
               <a:t>Data preparation </a:t>
             </a:r>
             <a:r>
-              <a:rPr lang="en-US" sz="2400" b="1" dirty="0">
+              <a:rPr lang="en-US" sz="2000" b="1" dirty="0">
                 <a:ln w="9525">
                   <a:solidFill>
                     <a:schemeClr val="bg1"/>
@@ -14186,27 +14196,9 @@
                   </a:outerShdw>
                 </a:effectLst>
               </a:rPr>
-              <a:t>[Feature Engineering]</a:t>
-            </a:r>
-            <a:r>
-              <a:rPr lang="en-US" sz="3600" b="1" dirty="0">
-                <a:ln w="9525">
-                  <a:solidFill>
-                    <a:schemeClr val="bg1"/>
-                  </a:solidFill>
-                  <a:prstDash val="solid"/>
-                </a:ln>
-                <a:effectLst>
-                  <a:outerShdw blurRad="12700" dist="38100" dir="2700000" algn="tl" rotWithShape="0">
-                    <a:schemeClr val="bg1">
-                      <a:lumMod val="50000"/>
-                    </a:schemeClr>
-                  </a:outerShdw>
-                </a:effectLst>
-              </a:rPr>
-              <a:t> </a:t>
-            </a:r>
-            <a:endParaRPr lang="en-US" sz="3600" b="1" cap="none" spc="0" dirty="0">
+              <a:t>[Feature Engineering] </a:t>
+            </a:r>
+            <a:endParaRPr lang="en-US" sz="2000" b="1" cap="none" spc="0" dirty="0">
               <a:ln w="9525">
                 <a:solidFill>
                   <a:schemeClr val="bg1"/>
@@ -14242,10 +14234,8 @@
                   </a:outerShdw>
                 </a:effectLst>
               </a:rPr>
-              <a:t>What do we need to do on the data in order to get data required to create the models?</a:t>
-            </a:r>
-          </a:p>
-          <a:p>
+              <a:t>What do we need to do on the data in order to get data required to create the models? </a:t>
+            </a:r>
             <a:r>
               <a:rPr lang="en-US" sz="1600" b="1" dirty="0" err="1">
                 <a:ln w="9525">
@@ -14375,8 +14365,8 @@
         </p:nvSpPr>
         <p:spPr>
           <a:xfrm>
-            <a:off x="5072505" y="4269845"/>
-            <a:ext cx="6845144" cy="830997"/>
+            <a:off x="5645888" y="4269845"/>
+            <a:ext cx="6149932" cy="1015663"/>
           </a:xfrm>
           <a:prstGeom prst="rect">
             <a:avLst/>
@@ -14384,14 +14374,14 @@
           <a:noFill/>
         </p:spPr>
         <p:txBody>
-          <a:bodyPr wrap="none" lIns="91440" tIns="45720" rIns="91440" bIns="45720">
+          <a:bodyPr wrap="square" lIns="91440" tIns="45720" rIns="91440" bIns="45720">
             <a:spAutoFit/>
           </a:bodyPr>
           <a:lstStyle/>
           <a:p>
             <a:pPr algn="ctr"/>
             <a:r>
-              <a:rPr lang="en-US" sz="3200" b="1" cap="none" spc="0" dirty="0">
+              <a:rPr lang="en-US" sz="2800" b="1" cap="none" spc="0" dirty="0">
                 <a:ln w="9525">
                   <a:solidFill>
                     <a:schemeClr val="bg1"/>
@@ -14412,7 +14402,7 @@
               <a:t>A preliminary Ingestion Process</a:t>
             </a:r>
             <a:r>
-              <a:rPr lang="en-US" sz="3200" b="1" dirty="0">
+              <a:rPr lang="en-US" sz="2800" b="1" dirty="0">
                 <a:ln w="9525">
                   <a:solidFill>
                     <a:schemeClr val="bg1"/>
@@ -14481,8 +14471,8 @@
         </p:nvSpPr>
         <p:spPr>
           <a:xfrm>
-            <a:off x="362622" y="5373561"/>
-            <a:ext cx="7637027" cy="1138773"/>
+            <a:off x="329315" y="5418320"/>
+            <a:ext cx="5995515" cy="1015663"/>
           </a:xfrm>
           <a:prstGeom prst="rect">
             <a:avLst/>
@@ -14490,14 +14480,14 @@
           <a:noFill/>
         </p:spPr>
         <p:txBody>
-          <a:bodyPr wrap="none" lIns="91440" tIns="45720" rIns="91440" bIns="45720">
+          <a:bodyPr wrap="square" lIns="91440" tIns="45720" rIns="91440" bIns="45720">
             <a:spAutoFit/>
           </a:bodyPr>
           <a:lstStyle/>
           <a:p>
             <a:pPr algn="ctr"/>
             <a:r>
-              <a:rPr lang="en-US" sz="3600" b="1" cap="none" spc="0" dirty="0">
+              <a:rPr lang="en-US" sz="2800" b="1" cap="none" spc="0" dirty="0">
                 <a:ln w="9525">
                   <a:solidFill>
                     <a:schemeClr val="bg1"/>
@@ -14518,7 +14508,7 @@
               <a:t>How to </a:t>
             </a:r>
             <a:r>
-              <a:rPr lang="en-US" sz="3600" b="1" dirty="0">
+              <a:rPr lang="en-US" sz="2800" b="1" dirty="0">
                 <a:ln w="9525">
                   <a:solidFill>
                     <a:schemeClr val="bg1"/>
@@ -14604,8 +14594,8 @@
         </p:nvSpPr>
         <p:spPr>
           <a:xfrm>
-            <a:off x="6625254" y="2037501"/>
-            <a:ext cx="4727576" cy="892552"/>
+            <a:off x="5157937" y="1964861"/>
+            <a:ext cx="7034063" cy="769441"/>
           </a:xfrm>
           <a:prstGeom prst="rect">
             <a:avLst/>
@@ -14613,14 +14603,53 @@
           <a:noFill/>
         </p:spPr>
         <p:txBody>
-          <a:bodyPr wrap="none" lIns="91440" tIns="45720" rIns="91440" bIns="45720">
+          <a:bodyPr wrap="square" lIns="91440" tIns="45720" rIns="91440" bIns="45720">
             <a:spAutoFit/>
           </a:bodyPr>
           <a:lstStyle/>
           <a:p>
             <a:pPr algn="ctr"/>
             <a:r>
-              <a:rPr lang="en-US" sz="3600" b="1" cap="none" spc="0" dirty="0">
+              <a:rPr lang="en-US" sz="2800" b="1" cap="none" spc="0" dirty="0">
+                <a:ln w="9525">
+                  <a:solidFill>
+                    <a:schemeClr val="bg1"/>
+                  </a:solidFill>
+                  <a:prstDash val="solid"/>
+                </a:ln>
+                <a:solidFill>
+                  <a:schemeClr val="tx1"/>
+                </a:solidFill>
+                <a:effectLst>
+                  <a:outerShdw blurRad="12700" dist="38100" dir="2700000" algn="tl" rotWithShape="0">
+                    <a:schemeClr val="bg1">
+                      <a:lumMod val="50000"/>
+                    </a:schemeClr>
+                  </a:outerShdw>
+                </a:effectLst>
+              </a:rPr>
+              <a:t>Splitting the dat</a:t>
+            </a:r>
+            <a:r>
+              <a:rPr lang="en-US" sz="2800" b="1" dirty="0">
+                <a:ln w="9525">
+                  <a:solidFill>
+                    <a:schemeClr val="bg1"/>
+                  </a:solidFill>
+                  <a:prstDash val="solid"/>
+                </a:ln>
+                <a:effectLst>
+                  <a:outerShdw blurRad="12700" dist="38100" dir="2700000" algn="tl" rotWithShape="0">
+                    <a:schemeClr val="bg1">
+                      <a:lumMod val="50000"/>
+                    </a:schemeClr>
+                  </a:outerShdw>
+                </a:effectLst>
+              </a:rPr>
+              <a:t>a &amp; </a:t>
+            </a:r>
+            <a:r>
+              <a:rPr lang="en-US" sz="2800" b="1" cap="none" spc="0" dirty="0">
                 <a:ln w="9525">
                   <a:solidFill>
                     <a:schemeClr val="bg1"/>
@@ -15559,7 +15588,7 @@
             <a:pPr algn="ctr"/>
             <a:r>
               <a:rPr lang="en-GB" dirty="0"/>
-              <a:t>Create TFM #1</a:t>
+              <a:t>Basic Flow - Create TFM #1</a:t>
             </a:r>
           </a:p>
         </p:txBody>
@@ -15651,7 +15680,7 @@
             <a:pPr algn="ctr"/>
             <a:r>
               <a:rPr lang="en-GB" dirty="0"/>
-              <a:t>Create TFM #..</a:t>
+              <a:t>Basic Flow - Create TFM #..</a:t>
             </a:r>
           </a:p>
         </p:txBody>
@@ -15699,7 +15728,7 @@
             <a:pPr algn="ctr"/>
             <a:r>
               <a:rPr lang="en-GB" dirty="0"/>
-              <a:t>Create TFM #6</a:t>
+              <a:t>Basic Flow - Create TFM #6</a:t>
             </a:r>
           </a:p>
         </p:txBody>
@@ -15983,8 +16012,8 @@
         </p:nvSpPr>
         <p:spPr>
           <a:xfrm>
-            <a:off x="8273181" y="3077570"/>
-            <a:ext cx="2853996" cy="682906"/>
+            <a:off x="8273181" y="2902688"/>
+            <a:ext cx="2853996" cy="1092454"/>
           </a:xfrm>
           <a:prstGeom prst="rightArrow">
             <a:avLst/>
@@ -16016,7 +16045,14 @@
             <a:pPr algn="ctr"/>
             <a:r>
               <a:rPr lang="en-GB" dirty="0"/>
-              <a:t>TFM 60% Corpora</a:t>
+              <a:t>TFM </a:t>
+            </a:r>
+          </a:p>
+          <a:p>
+            <a:pPr algn="ctr"/>
+            <a:r>
+              <a:rPr lang="en-GB" dirty="0"/>
+              <a:t>based on 60% Corpora</a:t>
             </a:r>
           </a:p>
         </p:txBody>
@@ -17026,7 +17062,7 @@
                   <a:schemeClr val="bg1"/>
                 </a:solidFill>
               </a:rPr>
-              <a:t>Calculate the «Stupid» backoff score and create an ad-hoc dats structure representing the language the model.</a:t>
+              <a:t>Calculate the «Stupid» backoff score and create an ad-hoc data structure representing the language the model.</a:t>
             </a:r>
           </a:p>
           <a:p>
@@ -22387,14 +22423,22 @@
         </p:spPr>
         <p:txBody>
           <a:bodyPr>
-            <a:normAutofit fontScale="90000"/>
+            <a:normAutofit/>
           </a:bodyPr>
           <a:lstStyle/>
           <a:p>
             <a:pPr algn="r"/>
             <a:r>
               <a:rPr lang="nb-NO" sz="4000" dirty="0"/>
-              <a:t>The Ingestion Pipeline – part 2</a:t>
+              <a:t>The Model </a:t>
+            </a:r>
+            <a:r>
+              <a:rPr lang="en-GB" sz="4000" dirty="0"/>
+              <a:t>creation</a:t>
+            </a:r>
+            <a:r>
+              <a:rPr lang="nb-NO" sz="4000" dirty="0"/>
+              <a:t> – part 2</a:t>
             </a:r>
             <a:endParaRPr lang="en-US" sz="4000" dirty="0"/>
           </a:p>

</xml_diff>